<commit_message>
Powerpoint und txt geändert
</commit_message>
<xml_diff>
--- a/Abschlussprojekt_Programmierübung_II.pptx
+++ b/Abschlussprojekt_Programmierübung_II.pptx
@@ -107,6 +107,11 @@
       </a:defRPr>
     </a:lvl9pPr>
   </p:defaultTextStyle>
+  <p:extLst>
+    <p:ext uri="{EFAFB233-063F-42B5-8137-9DF3F51BA10A}">
+      <p15:sldGuideLst xmlns:p15="http://schemas.microsoft.com/office/powerpoint/2012/main"/>
+    </p:ext>
+  </p:extLst>
 </p:presentation>
 </file>
 
@@ -3986,7 +3991,7 @@
         <p:spPr/>
         <p:txBody>
           <a:bodyPr>
-            <a:normAutofit lnSpcReduction="10000"/>
+            <a:normAutofit fontScale="92500" lnSpcReduction="10000"/>
           </a:bodyPr>
           <a:lstStyle/>
           <a:p>
@@ -4082,6 +4087,14 @@
               <a:rPr lang="de-AT" dirty="0"/>
               <a:t>Nutzer-, Testdaten editieren und hinzufügen</a:t>
             </a:r>
+          </a:p>
+          <a:p>
+            <a:pPr lvl="1"/>
+            <a:r>
+              <a:rPr lang="de-AT" dirty="0" err="1"/>
+              <a:t>Fitfiles</a:t>
+            </a:r>
+            <a:endParaRPr lang="de-AT" dirty="0"/>
           </a:p>
           <a:p>
             <a:r>
@@ -4185,7 +4198,13 @@
           <a:p>
             <a:r>
               <a:rPr lang="de-AT" dirty="0"/>
-              <a:t>Nutzer- und Testdaten über Drag and Drop hinzufügen</a:t>
+              <a:t>Testdaten über Drag and Drop hinzufügen</a:t>
+            </a:r>
+          </a:p>
+          <a:p>
+            <a:r>
+              <a:rPr lang="de-AT" dirty="0"/>
+              <a:t>(Test-/Nutzerdaten editieren)</a:t>
             </a:r>
           </a:p>
           <a:p>
@@ -4217,7 +4236,7 @@
           <a:p>
             <a:r>
               <a:rPr lang="de-AT" dirty="0"/>
-              <a:t>Einstellungen:</a:t>
+              <a:t>(Einstellungen:</a:t>
             </a:r>
           </a:p>
           <a:p>
@@ -4230,8 +4249,8 @@
           <a:p>
             <a:pPr lvl="1"/>
             <a:r>
-              <a:rPr lang="de-AT"/>
-              <a:t>Theme ändern</a:t>
+              <a:rPr lang="de-AT" dirty="0"/>
+              <a:t>Theme ändern)</a:t>
             </a:r>
           </a:p>
           <a:p>

</xml_diff>